<commit_message>
Updated Screen Mock-up Template
</commit_message>
<xml_diff>
--- a/Screen Mock-ups/ScreenMockups.pptx
+++ b/Screen Mock-ups/ScreenMockups.pptx
@@ -6,6 +6,7 @@
   </p:sldMasterIdLst>
   <p:sldIdLst>
     <p:sldId id="256" r:id="rId2"/>
+    <p:sldId id="257" r:id="rId3"/>
   </p:sldIdLst>
   <p:sldSz cx="9144000" cy="6858000" type="screen4x3"/>
   <p:notesSz cx="6858000" cy="9144000"/>
@@ -3219,6 +3220,163 @@
     <p:extLst>
       <p:ext uri="{BB962C8B-B14F-4D97-AF65-F5344CB8AC3E}">
         <p14:creationId xmlns:p14="http://schemas.microsoft.com/office/powerpoint/2010/main" val="3265360501"/>
+      </p:ext>
+    </p:extLst>
+  </p:cSld>
+  <p:clrMapOvr>
+    <a:masterClrMapping/>
+  </p:clrMapOvr>
+  <p:timing>
+    <p:tnLst>
+      <p:par>
+        <p:cTn xmlns:p14="http://schemas.microsoft.com/office/powerpoint/2010/main" id="1" dur="indefinite" restart="never" nodeType="tmRoot"/>
+      </p:par>
+    </p:tnLst>
+  </p:timing>
+</p:sld>
+</file>
+
+<file path=ppt/slides/slide2.xml><?xml version="1.0" encoding="utf-8"?>
+<p:sld xmlns:a="http://schemas.openxmlformats.org/drawingml/2006/main" xmlns:r="http://schemas.openxmlformats.org/officeDocument/2006/relationships" xmlns:p="http://schemas.openxmlformats.org/presentationml/2006/main">
+  <p:cSld>
+    <p:spTree>
+      <p:nvGrpSpPr>
+        <p:cNvPr id="1" name=""/>
+        <p:cNvGrpSpPr/>
+        <p:nvPr/>
+      </p:nvGrpSpPr>
+      <p:grpSpPr>
+        <a:xfrm>
+          <a:off x="0" y="0"/>
+          <a:ext cx="0" cy="0"/>
+          <a:chOff x="0" y="0"/>
+          <a:chExt cx="0" cy="0"/>
+        </a:xfrm>
+      </p:grpSpPr>
+      <p:sp>
+        <p:nvSpPr>
+          <p:cNvPr id="4" name="Rectangle 3"/>
+          <p:cNvSpPr>
+            <a:spLocks noChangeAspect="1"/>
+          </p:cNvSpPr>
+          <p:nvPr/>
+        </p:nvSpPr>
+        <p:spPr>
+          <a:xfrm>
+            <a:off x="244557" y="228600"/>
+            <a:ext cx="3600450" cy="6400800"/>
+          </a:xfrm>
+          <a:prstGeom prst="rect">
+            <a:avLst/>
+          </a:prstGeom>
+          <a:solidFill>
+            <a:schemeClr val="bg1">
+              <a:lumMod val="85000"/>
+            </a:schemeClr>
+          </a:solidFill>
+          <a:ln>
+            <a:solidFill>
+              <a:schemeClr val="tx2"/>
+            </a:solidFill>
+          </a:ln>
+        </p:spPr>
+        <p:style>
+          <a:lnRef idx="1">
+            <a:schemeClr val="accent1"/>
+          </a:lnRef>
+          <a:fillRef idx="3">
+            <a:schemeClr val="accent1"/>
+          </a:fillRef>
+          <a:effectRef idx="2">
+            <a:schemeClr val="accent1"/>
+          </a:effectRef>
+          <a:fontRef idx="minor">
+            <a:schemeClr val="lt1"/>
+          </a:fontRef>
+        </p:style>
+        <p:txBody>
+          <a:bodyPr rtlCol="0" anchor="ctr"/>
+          <a:lstStyle/>
+          <a:p>
+            <a:pPr algn="ctr"/>
+            <a:endParaRPr lang="en-US" dirty="0">
+              <a:solidFill>
+                <a:schemeClr val="bg1">
+                  <a:lumMod val="85000"/>
+                </a:schemeClr>
+              </a:solidFill>
+            </a:endParaRPr>
+          </a:p>
+        </p:txBody>
+      </p:sp>
+      <p:sp>
+        <p:nvSpPr>
+          <p:cNvPr id="5" name="TextBox 4"/>
+          <p:cNvSpPr txBox="1"/>
+          <p:nvPr/>
+        </p:nvSpPr>
+        <p:spPr>
+          <a:xfrm>
+            <a:off x="4034255" y="531242"/>
+            <a:ext cx="4968110" cy="369332"/>
+          </a:xfrm>
+          <a:prstGeom prst="rect">
+            <a:avLst/>
+          </a:prstGeom>
+          <a:noFill/>
+          <a:ln>
+            <a:noFill/>
+          </a:ln>
+        </p:spPr>
+        <p:txBody>
+          <a:bodyPr wrap="square" rtlCol="0">
+            <a:spAutoFit/>
+          </a:bodyPr>
+          <a:lstStyle/>
+          <a:p>
+            <a:r>
+              <a:rPr lang="en-US" dirty="0" smtClean="0"/>
+              <a:t>Screen Description:</a:t>
+            </a:r>
+            <a:endParaRPr lang="en-US" dirty="0"/>
+          </a:p>
+        </p:txBody>
+      </p:sp>
+      <p:sp>
+        <p:nvSpPr>
+          <p:cNvPr id="6" name="TextBox 5"/>
+          <p:cNvSpPr txBox="1"/>
+          <p:nvPr/>
+        </p:nvSpPr>
+        <p:spPr>
+          <a:xfrm>
+            <a:off x="4034255" y="9292"/>
+            <a:ext cx="4968110" cy="461665"/>
+          </a:xfrm>
+          <a:prstGeom prst="rect">
+            <a:avLst/>
+          </a:prstGeom>
+          <a:noFill/>
+        </p:spPr>
+        <p:txBody>
+          <a:bodyPr wrap="square" rtlCol="0" anchor="ctr">
+            <a:spAutoFit/>
+          </a:bodyPr>
+          <a:lstStyle/>
+          <a:p>
+            <a:pPr algn="ctr"/>
+            <a:r>
+              <a:rPr lang="en-US" sz="2400" b="1" u="sng" dirty="0" smtClean="0"/>
+              <a:t>SCREEN NAME</a:t>
+            </a:r>
+            <a:endParaRPr lang="en-US" sz="2400" b="1" u="sng" dirty="0"/>
+          </a:p>
+        </p:txBody>
+      </p:sp>
+    </p:spTree>
+    <p:extLst>
+      <p:ext uri="{BB962C8B-B14F-4D97-AF65-F5344CB8AC3E}">
+        <p14:creationId xmlns:p14="http://schemas.microsoft.com/office/powerpoint/2010/main" val="744523751"/>
       </p:ext>
     </p:extLst>
   </p:cSld>

</xml_diff>